<commit_message>
Upload takmer finalnej verzie vsetkeho
</commit_message>
<xml_diff>
--- a/technicka dokumentacia a prezentacia/Prezentácia Frogger.pptx
+++ b/technicka dokumentacia a prezentacia/Prezentácia Frogger.pptx
@@ -5,13 +5,13 @@
     <p:sldMasterId id="2147483648" r:id="rId1"/>
   </p:sldMasterIdLst>
   <p:notesMasterIdLst>
-    <p:notesMasterId r:id="rId13"/>
+    <p:notesMasterId r:id="rId14"/>
   </p:notesMasterIdLst>
   <p:sldIdLst>
     <p:sldId id="256" r:id="rId2"/>
     <p:sldId id="258" r:id="rId3"/>
-    <p:sldId id="278" r:id="rId4"/>
-    <p:sldId id="277" r:id="rId5"/>
+    <p:sldId id="281" r:id="rId4"/>
+    <p:sldId id="282" r:id="rId5"/>
     <p:sldId id="273" r:id="rId6"/>
     <p:sldId id="272" r:id="rId7"/>
     <p:sldId id="274" r:id="rId8"/>
@@ -19,6 +19,7 @@
     <p:sldId id="280" r:id="rId10"/>
     <p:sldId id="276" r:id="rId11"/>
     <p:sldId id="279" r:id="rId12"/>
+    <p:sldId id="283" r:id="rId13"/>
   </p:sldIdLst>
   <p:sldSz cx="12192000" cy="6858000"/>
   <p:notesSz cx="6858000" cy="9144000"/>
@@ -570,9 +571,9 @@
 </file>
 
 <file path=ppt/charts/chart1.xml><?xml version="1.0" encoding="utf-8"?>
-<c:chartSpace xmlns:c="http://schemas.openxmlformats.org/drawingml/2006/chart" xmlns:a="http://schemas.openxmlformats.org/drawingml/2006/main" xmlns:r="http://schemas.openxmlformats.org/officeDocument/2006/relationships" xmlns:c16r2="http://schemas.microsoft.com/office/drawing/2015/06/chart">
+<c:chartSpace xmlns:c="http://schemas.openxmlformats.org/drawingml/2006/chart" xmlns:a="http://schemas.openxmlformats.org/drawingml/2006/main" xmlns:r="http://schemas.openxmlformats.org/officeDocument/2006/relationships">
   <c:date1904 val="0"/>
-  <c:lang val="en-US"/>
+  <c:lang val="sk-SK"/>
   <c:roundedCorners val="0"/>
   <mc:AlternateContent xmlns:mc="http://schemas.openxmlformats.org/markup-compatibility/2006">
     <mc:Choice xmlns:c14="http://schemas.microsoft.com/office/drawing/2007/8/2/chart" Requires="c14">
@@ -665,7 +666,7 @@
               </c:numCache>
             </c:numRef>
           </c:val>
-          <c:extLst>
+          <c:extLst xmlns:c16r2="http://schemas.microsoft.com/office/drawing/2015/06/chart">
             <c:ext xmlns:c16="http://schemas.microsoft.com/office/drawing/2014/chart" uri="{C3380CC4-5D6E-409C-BE32-E72D297353CC}">
               <c16:uniqueId val="{00000000-5DC9-4BDC-BCD6-5CAA05510275}"/>
             </c:ext>
@@ -736,7 +737,7 @@
               </c:numCache>
             </c:numRef>
           </c:val>
-          <c:extLst>
+          <c:extLst xmlns:c16r2="http://schemas.microsoft.com/office/drawing/2015/06/chart">
             <c:ext xmlns:c16="http://schemas.microsoft.com/office/drawing/2014/chart" uri="{C3380CC4-5D6E-409C-BE32-E72D297353CC}">
               <c16:uniqueId val="{00000001-5DC9-4BDC-BCD6-5CAA05510275}"/>
             </c:ext>
@@ -807,7 +808,7 @@
               </c:numCache>
             </c:numRef>
           </c:val>
-          <c:extLst>
+          <c:extLst xmlns:c16r2="http://schemas.microsoft.com/office/drawing/2015/06/chart">
             <c:ext xmlns:c16="http://schemas.microsoft.com/office/drawing/2014/chart" uri="{C3380CC4-5D6E-409C-BE32-E72D297353CC}">
               <c16:uniqueId val="{00000002-5DC9-4BDC-BCD6-5CAA05510275}"/>
             </c:ext>
@@ -823,11 +824,11 @@
         </c:dLbls>
         <c:gapWidth val="110"/>
         <c:overlap val="-13"/>
-        <c:axId val="332502704"/>
-        <c:axId val="332503088"/>
+        <c:axId val="426800664"/>
+        <c:axId val="22657560"/>
       </c:barChart>
       <c:catAx>
-        <c:axId val="332502704"/>
+        <c:axId val="426800664"/>
         <c:scaling>
           <c:orientation val="minMax"/>
         </c:scaling>
@@ -864,10 +865,10 @@
                 <a:cs typeface="+mn-cs"/>
               </a:defRPr>
             </a:pPr>
-            <a:endParaRPr lang="en-US"/>
+            <a:endParaRPr lang="sk-SK"/>
           </a:p>
         </c:txPr>
-        <c:crossAx val="332503088"/>
+        <c:crossAx val="22657560"/>
         <c:crosses val="autoZero"/>
         <c:auto val="1"/>
         <c:lblAlgn val="ctr"/>
@@ -875,7 +876,7 @@
         <c:noMultiLvlLbl val="0"/>
       </c:catAx>
       <c:valAx>
-        <c:axId val="332503088"/>
+        <c:axId val="22657560"/>
         <c:scaling>
           <c:orientation val="minMax"/>
         </c:scaling>
@@ -920,10 +921,10 @@
                 <a:cs typeface="+mn-cs"/>
               </a:defRPr>
             </a:pPr>
-            <a:endParaRPr lang="en-US"/>
+            <a:endParaRPr lang="sk-SK"/>
           </a:p>
         </c:txPr>
-        <c:crossAx val="332502704"/>
+        <c:crossAx val="426800664"/>
         <c:crosses val="autoZero"/>
         <c:crossBetween val="between"/>
       </c:valAx>
@@ -969,7 +970,7 @@
               <a:cs typeface="+mn-cs"/>
             </a:defRPr>
           </a:pPr>
-          <a:endParaRPr lang="en-US"/>
+          <a:endParaRPr lang="sk-SK"/>
         </a:p>
       </c:txPr>
     </c:legend>
@@ -991,7 +992,7 @@
       <a:pPr>
         <a:defRPr/>
       </a:pPr>
-      <a:endParaRPr lang="en-US"/>
+      <a:endParaRPr lang="sk-SK"/>
     </a:p>
   </c:txPr>
   <c:externalData r:id="rId3">
@@ -1627,7 +1628,7 @@
           <a:p>
             <a:fld id="{36F1F174-C4BC-460C-9DE8-4EBD38507E38}" type="datetimeFigureOut">
               <a:rPr lang="en-US" smtClean="0"/>
-              <a:t>12/12/2023</a:t>
+              <a:t>12/13/2023</a:t>
             </a:fld>
             <a:endParaRPr lang="en-US"/>
           </a:p>
@@ -5411,7 +5412,7 @@
           <p:cNvPr id="2" name="Slide Number Placeholder 1">
             <a:extLst>
               <a:ext uri="{FF2B5EF4-FFF2-40B4-BE49-F238E27FC236}">
-                <a16:creationId xmlns:a16="http://schemas.microsoft.com/office/drawing/2014/main" id="{D5736FC5-A67E-2FDC-C45B-22D4A3E6CF35}"/>
+                <a16:creationId xmlns:a16="http://schemas.microsoft.com/office/drawing/2014/main" xmlns="" id="{D5736FC5-A67E-2FDC-C45B-22D4A3E6CF35}"/>
               </a:ext>
             </a:extLst>
           </p:cNvPr>
@@ -5441,7 +5442,7 @@
           <p:cNvPr id="3" name="Zástupný objekt pre číslo snímky 5">
             <a:extLst>
               <a:ext uri="{FF2B5EF4-FFF2-40B4-BE49-F238E27FC236}">
-                <a16:creationId xmlns:a16="http://schemas.microsoft.com/office/drawing/2014/main" id="{99501F4B-99A8-243A-C70A-38D102601AB2}"/>
+                <a16:creationId xmlns:a16="http://schemas.microsoft.com/office/drawing/2014/main" xmlns="" id="{99501F4B-99A8-243A-C70A-38D102601AB2}"/>
               </a:ext>
             </a:extLst>
           </p:cNvPr>
@@ -5571,7 +5572,7 @@
           <p:cNvPr id="4" name="TextBox 3">
             <a:extLst>
               <a:ext uri="{FF2B5EF4-FFF2-40B4-BE49-F238E27FC236}">
-                <a16:creationId xmlns:a16="http://schemas.microsoft.com/office/drawing/2014/main" id="{4F947B76-FA7D-7469-74E8-55845885B998}"/>
+                <a16:creationId xmlns:a16="http://schemas.microsoft.com/office/drawing/2014/main" xmlns="" id="{4F947B76-FA7D-7469-74E8-55845885B998}"/>
               </a:ext>
             </a:extLst>
           </p:cNvPr>
@@ -5613,7 +5614,7 @@
           <p:cNvPr id="5" name="BlokTextu 3">
             <a:extLst>
               <a:ext uri="{FF2B5EF4-FFF2-40B4-BE49-F238E27FC236}">
-                <a16:creationId xmlns:a16="http://schemas.microsoft.com/office/drawing/2014/main" id="{1340C5BF-1BA5-9875-D090-F89DFBBE4F3D}"/>
+                <a16:creationId xmlns:a16="http://schemas.microsoft.com/office/drawing/2014/main" xmlns="" id="{1340C5BF-1BA5-9875-D090-F89DFBBE4F3D}"/>
               </a:ext>
             </a:extLst>
           </p:cNvPr>
@@ -5750,7 +5751,7 @@
           <p:cNvPr id="2" name="Slide Number Placeholder 1">
             <a:extLst>
               <a:ext uri="{FF2B5EF4-FFF2-40B4-BE49-F238E27FC236}">
-                <a16:creationId xmlns:a16="http://schemas.microsoft.com/office/drawing/2014/main" id="{A340F562-B867-85FE-928C-F78F6BADBAE5}"/>
+                <a16:creationId xmlns:a16="http://schemas.microsoft.com/office/drawing/2014/main" xmlns="" id="{A340F562-B867-85FE-928C-F78F6BADBAE5}"/>
               </a:ext>
             </a:extLst>
           </p:cNvPr>
@@ -5780,7 +5781,7 @@
           <p:cNvPr id="3" name="Slide Number Placeholder 1">
             <a:extLst>
               <a:ext uri="{FF2B5EF4-FFF2-40B4-BE49-F238E27FC236}">
-                <a16:creationId xmlns:a16="http://schemas.microsoft.com/office/drawing/2014/main" id="{8548232D-2419-DFC8-7E46-C4314A42C54C}"/>
+                <a16:creationId xmlns:a16="http://schemas.microsoft.com/office/drawing/2014/main" xmlns="" id="{8548232D-2419-DFC8-7E46-C4314A42C54C}"/>
               </a:ext>
             </a:extLst>
           </p:cNvPr>
@@ -5910,7 +5911,7 @@
           <p:cNvPr id="4" name="Zástupný objekt pre číslo snímky 5">
             <a:extLst>
               <a:ext uri="{FF2B5EF4-FFF2-40B4-BE49-F238E27FC236}">
-                <a16:creationId xmlns:a16="http://schemas.microsoft.com/office/drawing/2014/main" id="{3E07D128-AF23-88E1-3AD8-B9749033FBE2}"/>
+                <a16:creationId xmlns:a16="http://schemas.microsoft.com/office/drawing/2014/main" xmlns="" id="{3E07D128-AF23-88E1-3AD8-B9749033FBE2}"/>
               </a:ext>
             </a:extLst>
           </p:cNvPr>
@@ -6040,7 +6041,7 @@
           <p:cNvPr id="5" name="TextBox 4">
             <a:extLst>
               <a:ext uri="{FF2B5EF4-FFF2-40B4-BE49-F238E27FC236}">
-                <a16:creationId xmlns:a16="http://schemas.microsoft.com/office/drawing/2014/main" id="{FAE17B85-C6B3-107F-731D-DB7014B4A4BC}"/>
+                <a16:creationId xmlns:a16="http://schemas.microsoft.com/office/drawing/2014/main" xmlns="" id="{FAE17B85-C6B3-107F-731D-DB7014B4A4BC}"/>
               </a:ext>
             </a:extLst>
           </p:cNvPr>
@@ -6082,7 +6083,7 @@
           <p:cNvPr id="6" name="BlokTextu 3">
             <a:extLst>
               <a:ext uri="{FF2B5EF4-FFF2-40B4-BE49-F238E27FC236}">
-                <a16:creationId xmlns:a16="http://schemas.microsoft.com/office/drawing/2014/main" id="{DB8C9796-32B7-031A-9F6D-42E88DE22DF1}"/>
+                <a16:creationId xmlns:a16="http://schemas.microsoft.com/office/drawing/2014/main" xmlns="" id="{DB8C9796-32B7-031A-9F6D-42E88DE22DF1}"/>
               </a:ext>
             </a:extLst>
           </p:cNvPr>
@@ -6220,6 +6221,66 @@
     <p:extLst>
       <p:ext uri="{BB962C8B-B14F-4D97-AF65-F5344CB8AC3E}">
         <p14:creationId xmlns:p14="http://schemas.microsoft.com/office/powerpoint/2010/main" val="3477235206"/>
+      </p:ext>
+    </p:extLst>
+  </p:cSld>
+  <p:clrMapOvr>
+    <a:masterClrMapping/>
+  </p:clrMapOvr>
+</p:sld>
+</file>
+
+<file path=ppt/slides/slide12.xml><?xml version="1.0" encoding="utf-8"?>
+<p:sld xmlns:a="http://schemas.openxmlformats.org/drawingml/2006/main" xmlns:r="http://schemas.openxmlformats.org/officeDocument/2006/relationships" xmlns:p="http://schemas.openxmlformats.org/presentationml/2006/main">
+  <p:cSld>
+    <p:spTree>
+      <p:nvGrpSpPr>
+        <p:cNvPr id="1" name=""/>
+        <p:cNvGrpSpPr/>
+        <p:nvPr/>
+      </p:nvGrpSpPr>
+      <p:grpSpPr>
+        <a:xfrm>
+          <a:off x="0" y="0"/>
+          <a:ext cx="0" cy="0"/>
+          <a:chOff x="0" y="0"/>
+          <a:chExt cx="0" cy="0"/>
+        </a:xfrm>
+      </p:grpSpPr>
+      <p:sp>
+        <p:nvSpPr>
+          <p:cNvPr id="3" name="BlokTextu 2"/>
+          <p:cNvSpPr txBox="1"/>
+          <p:nvPr/>
+        </p:nvSpPr>
+        <p:spPr>
+          <a:xfrm>
+            <a:off x="2191110" y="2320506"/>
+            <a:ext cx="8022566" cy="1015663"/>
+          </a:xfrm>
+          <a:prstGeom prst="rect">
+            <a:avLst/>
+          </a:prstGeom>
+          <a:noFill/>
+        </p:spPr>
+        <p:txBody>
+          <a:bodyPr wrap="square" rtlCol="0">
+            <a:spAutoFit/>
+          </a:bodyPr>
+          <a:lstStyle/>
+          <a:p>
+            <a:r>
+              <a:rPr lang="sk-SK" sz="6000" dirty="0" smtClean="0"/>
+              <a:t>Ďakujeme za pozornosť ;)</a:t>
+            </a:r>
+            <a:endParaRPr lang="sk-SK" sz="6000" dirty="0"/>
+          </a:p>
+        </p:txBody>
+      </p:sp>
+    </p:spTree>
+    <p:extLst>
+      <p:ext uri="{BB962C8B-B14F-4D97-AF65-F5344CB8AC3E}">
+        <p14:creationId xmlns:p14="http://schemas.microsoft.com/office/powerpoint/2010/main" val="1986350710"/>
       </p:ext>
     </p:extLst>
   </p:cSld>
@@ -6305,7 +6366,7 @@
           <p:cNvPr id="16" name="Obrázok 15">
             <a:extLst>
               <a:ext uri="{FF2B5EF4-FFF2-40B4-BE49-F238E27FC236}">
-                <a16:creationId xmlns:a16="http://schemas.microsoft.com/office/drawing/2014/main" id="{0ED8698F-F888-4434-BB4E-4DF483766D64}"/>
+                <a16:creationId xmlns:a16="http://schemas.microsoft.com/office/drawing/2014/main" xmlns="" id="{0ED8698F-F888-4434-BB4E-4DF483766D64}"/>
               </a:ext>
             </a:extLst>
           </p:cNvPr>
@@ -6335,7 +6396,7 @@
           <p:cNvPr id="1026" name="Picture 2">
             <a:extLst>
               <a:ext uri="{FF2B5EF4-FFF2-40B4-BE49-F238E27FC236}">
-                <a16:creationId xmlns:a16="http://schemas.microsoft.com/office/drawing/2014/main" id="{8453712D-2305-4913-BD40-4B123B645835}"/>
+                <a16:creationId xmlns:a16="http://schemas.microsoft.com/office/drawing/2014/main" xmlns="" id="{8453712D-2305-4913-BD40-4B123B645835}"/>
               </a:ext>
             </a:extLst>
           </p:cNvPr>
@@ -6382,7 +6443,7 @@
           <p:cNvPr id="17" name="BlokTextu 16">
             <a:extLst>
               <a:ext uri="{FF2B5EF4-FFF2-40B4-BE49-F238E27FC236}">
-                <a16:creationId xmlns:a16="http://schemas.microsoft.com/office/drawing/2014/main" id="{3A9F805E-5BB6-450C-BF46-5BC8E9E413F8}"/>
+                <a16:creationId xmlns:a16="http://schemas.microsoft.com/office/drawing/2014/main" xmlns="" id="{3A9F805E-5BB6-450C-BF46-5BC8E9E413F8}"/>
               </a:ext>
             </a:extLst>
           </p:cNvPr>
@@ -6417,7 +6478,7 @@
           <p:cNvPr id="19" name="BlokTextu 18">
             <a:extLst>
               <a:ext uri="{FF2B5EF4-FFF2-40B4-BE49-F238E27FC236}">
-                <a16:creationId xmlns:a16="http://schemas.microsoft.com/office/drawing/2014/main" id="{50F3312E-BECA-400D-AE7C-56D7C07244AA}"/>
+                <a16:creationId xmlns:a16="http://schemas.microsoft.com/office/drawing/2014/main" xmlns="" id="{50F3312E-BECA-400D-AE7C-56D7C07244AA}"/>
               </a:ext>
             </a:extLst>
           </p:cNvPr>
@@ -6457,7 +6518,7 @@
           <p:cNvPr id="1028" name="Picture 4" descr="Obrázok">
             <a:extLst>
               <a:ext uri="{FF2B5EF4-FFF2-40B4-BE49-F238E27FC236}">
-                <a16:creationId xmlns:a16="http://schemas.microsoft.com/office/drawing/2014/main" id="{166537BB-E041-4DAE-9657-2E02CC7C48A0}"/>
+                <a16:creationId xmlns:a16="http://schemas.microsoft.com/office/drawing/2014/main" xmlns="" id="{166537BB-E041-4DAE-9657-2E02CC7C48A0}"/>
               </a:ext>
             </a:extLst>
           </p:cNvPr>
@@ -6504,7 +6565,7 @@
           <p:cNvPr id="21" name="BlokTextu 20">
             <a:extLst>
               <a:ext uri="{FF2B5EF4-FFF2-40B4-BE49-F238E27FC236}">
-                <a16:creationId xmlns:a16="http://schemas.microsoft.com/office/drawing/2014/main" id="{65760197-57BB-4E3B-8A04-4DA1B0606DEB}"/>
+                <a16:creationId xmlns:a16="http://schemas.microsoft.com/office/drawing/2014/main" xmlns="" id="{65760197-57BB-4E3B-8A04-4DA1B0606DEB}"/>
               </a:ext>
             </a:extLst>
           </p:cNvPr>
@@ -6544,7 +6605,7 @@
           <p:cNvPr id="1030" name="Picture 6" descr="Obrázok">
             <a:extLst>
               <a:ext uri="{FF2B5EF4-FFF2-40B4-BE49-F238E27FC236}">
-                <a16:creationId xmlns:a16="http://schemas.microsoft.com/office/drawing/2014/main" id="{41B9B691-47C0-4CCD-9911-6D4C14DD532E}"/>
+                <a16:creationId xmlns:a16="http://schemas.microsoft.com/office/drawing/2014/main" xmlns="" id="{41B9B691-47C0-4CCD-9911-6D4C14DD532E}"/>
               </a:ext>
             </a:extLst>
           </p:cNvPr>
@@ -6591,7 +6652,7 @@
           <p:cNvPr id="23" name="BlokTextu 22">
             <a:extLst>
               <a:ext uri="{FF2B5EF4-FFF2-40B4-BE49-F238E27FC236}">
-                <a16:creationId xmlns:a16="http://schemas.microsoft.com/office/drawing/2014/main" id="{6E3D7FB7-9D29-4FA9-A957-B07F3C900F43}"/>
+                <a16:creationId xmlns:a16="http://schemas.microsoft.com/office/drawing/2014/main" xmlns="" id="{6E3D7FB7-9D29-4FA9-A957-B07F3C900F43}"/>
               </a:ext>
             </a:extLst>
           </p:cNvPr>
@@ -6631,7 +6692,7 @@
           <p:cNvPr id="27" name="Picture 8" descr="Obrázok">
             <a:extLst>
               <a:ext uri="{FF2B5EF4-FFF2-40B4-BE49-F238E27FC236}">
-                <a16:creationId xmlns:a16="http://schemas.microsoft.com/office/drawing/2014/main" id="{50C6DE81-999E-4E48-944C-39EED549BA7B}"/>
+                <a16:creationId xmlns:a16="http://schemas.microsoft.com/office/drawing/2014/main" xmlns="" id="{50C6DE81-999E-4E48-944C-39EED549BA7B}"/>
               </a:ext>
             </a:extLst>
           </p:cNvPr>
@@ -6676,7 +6737,7 @@
           <p:cNvPr id="28" name="BlokTextu 27">
             <a:extLst>
               <a:ext uri="{FF2B5EF4-FFF2-40B4-BE49-F238E27FC236}">
-                <a16:creationId xmlns:a16="http://schemas.microsoft.com/office/drawing/2014/main" id="{36812307-530F-4A62-8DC5-5DC66FAF35EB}"/>
+                <a16:creationId xmlns:a16="http://schemas.microsoft.com/office/drawing/2014/main" xmlns="" id="{36812307-530F-4A62-8DC5-5DC66FAF35EB}"/>
               </a:ext>
             </a:extLst>
           </p:cNvPr>
@@ -6743,13 +6804,7 @@
       </p:grpSpPr>
       <p:sp>
         <p:nvSpPr>
-          <p:cNvPr id="2" name="Slide Number Placeholder 1">
-            <a:extLst>
-              <a:ext uri="{FF2B5EF4-FFF2-40B4-BE49-F238E27FC236}">
-                <a16:creationId xmlns:a16="http://schemas.microsoft.com/office/drawing/2014/main" id="{B198C0E6-A790-52E0-8D33-E4281CD4FB5D}"/>
-              </a:ext>
-            </a:extLst>
-          </p:cNvPr>
+          <p:cNvPr id="6" name="Zástupný objekt pre číslo snímky 5"/>
           <p:cNvSpPr>
             <a:spLocks noGrp="1"/>
           </p:cNvSpPr>
@@ -6773,68 +6828,185 @@
       </p:sp>
       <p:sp>
         <p:nvSpPr>
-          <p:cNvPr id="3" name="Picture Placeholder 2">
+          <p:cNvPr id="5" name="TextBox 4">
             <a:extLst>
               <a:ext uri="{FF2B5EF4-FFF2-40B4-BE49-F238E27FC236}">
-                <a16:creationId xmlns:a16="http://schemas.microsoft.com/office/drawing/2014/main" id="{2E5A0217-1139-A70C-54B4-CDFFB05C06FF}"/>
+                <a16:creationId xmlns:a16="http://schemas.microsoft.com/office/drawing/2014/main" xmlns="" id="{01F492A4-FF4D-DF8E-ABBB-92929169DB1D}"/>
               </a:ext>
             </a:extLst>
           </p:cNvPr>
-          <p:cNvSpPr>
-            <a:spLocks noGrp="1"/>
-          </p:cNvSpPr>
-          <p:nvPr>
-            <p:ph type="pic" idx="1"/>
-          </p:nvPr>
+          <p:cNvSpPr txBox="1"/>
+          <p:nvPr/>
         </p:nvSpPr>
-        <p:spPr/>
+        <p:spPr>
+          <a:xfrm>
+            <a:off x="544236" y="634482"/>
+            <a:ext cx="7599100" cy="707886"/>
+          </a:xfrm>
+          <a:prstGeom prst="rect">
+            <a:avLst/>
+          </a:prstGeom>
+          <a:noFill/>
+        </p:spPr>
         <p:txBody>
-          <a:bodyPr/>
+          <a:bodyPr wrap="square" rtlCol="0">
+            <a:spAutoFit/>
+          </a:bodyPr>
           <a:lstStyle/>
           <a:p>
-            <a:endParaRPr lang="en-US" dirty="0"/>
+            <a:r>
+              <a:rPr lang="sk-SK" sz="4000" dirty="0" smtClean="0">
+                <a:latin typeface="Arial" panose="020B0604020202020204" pitchFamily="34" charset="0"/>
+                <a:cs typeface="Arial" panose="020B0604020202020204" pitchFamily="34" charset="0"/>
+              </a:rPr>
+              <a:t>Riešený projekt - </a:t>
+            </a:r>
+            <a:r>
+              <a:rPr lang="sk-SK" sz="4000" dirty="0" err="1">
+                <a:latin typeface="Arial" panose="020B0604020202020204" pitchFamily="34" charset="0"/>
+                <a:cs typeface="Arial" panose="020B0604020202020204" pitchFamily="34" charset="0"/>
+              </a:rPr>
+              <a:t>F</a:t>
+            </a:r>
+            <a:r>
+              <a:rPr lang="sk-SK" sz="4000" dirty="0" err="1" smtClean="0">
+                <a:latin typeface="Arial" panose="020B0604020202020204" pitchFamily="34" charset="0"/>
+                <a:cs typeface="Arial" panose="020B0604020202020204" pitchFamily="34" charset="0"/>
+              </a:rPr>
+              <a:t>rogger</a:t>
+            </a:r>
+            <a:endParaRPr lang="en-US" sz="4000" dirty="0">
+              <a:latin typeface="Arial" panose="020B0604020202020204" pitchFamily="34" charset="0"/>
+              <a:cs typeface="Arial" panose="020B0604020202020204" pitchFamily="34" charset="0"/>
+            </a:endParaRPr>
           </a:p>
         </p:txBody>
       </p:sp>
       <p:sp>
         <p:nvSpPr>
-          <p:cNvPr id="4" name="Title 3">
+          <p:cNvPr id="7" name="BlokTextu 3">
             <a:extLst>
               <a:ext uri="{FF2B5EF4-FFF2-40B4-BE49-F238E27FC236}">
-                <a16:creationId xmlns:a16="http://schemas.microsoft.com/office/drawing/2014/main" id="{BBED2D9E-F1D3-025A-F2E8-B7745D348D7C}"/>
+                <a16:creationId xmlns:a16="http://schemas.microsoft.com/office/drawing/2014/main" xmlns="" id="{D4C40A90-040D-9EF0-8383-909BF294BB42}"/>
               </a:ext>
             </a:extLst>
           </p:cNvPr>
-          <p:cNvSpPr>
-            <a:spLocks noGrp="1"/>
-          </p:cNvSpPr>
-          <p:nvPr>
-            <p:ph type="title"/>
-          </p:nvPr>
+          <p:cNvSpPr txBox="1"/>
+          <p:nvPr/>
         </p:nvSpPr>
-        <p:spPr/>
+        <p:spPr>
+          <a:xfrm>
+            <a:off x="385616" y="1699397"/>
+            <a:ext cx="10922000" cy="3416320"/>
+          </a:xfrm>
+          <a:prstGeom prst="rect">
+            <a:avLst/>
+          </a:prstGeom>
+          <a:noFill/>
+        </p:spPr>
         <p:txBody>
-          <a:bodyPr>
-            <a:normAutofit/>
+          <a:bodyPr wrap="square" rtlCol="0">
+            <a:spAutoFit/>
           </a:bodyPr>
           <a:lstStyle/>
           <a:p>
-            <a:r>
-              <a:rPr lang="sk-SK" sz="4400" dirty="0"/>
-              <a:t>Riešený projekt - </a:t>
-            </a:r>
-            <a:r>
-              <a:rPr lang="sk-SK" sz="4400" dirty="0" err="1"/>
-              <a:t>Frogger</a:t>
-            </a:r>
-            <a:endParaRPr lang="en-US" sz="4400" dirty="0"/>
+            <a:pPr marL="342900" indent="-342900">
+              <a:buFont typeface="Arial" panose="020B0604020202020204" pitchFamily="34" charset="0"/>
+              <a:buChar char="•"/>
+            </a:pPr>
+            <a:r>
+              <a:rPr lang="sk-SK" sz="2400" dirty="0" smtClean="0"/>
+              <a:t>Počítačová hra s jednoduchým konceptom</a:t>
+            </a:r>
+          </a:p>
+          <a:p>
+            <a:pPr marL="342900" indent="-342900">
+              <a:buFont typeface="Arial" panose="020B0604020202020204" pitchFamily="34" charset="0"/>
+              <a:buChar char="•"/>
+            </a:pPr>
+            <a:endParaRPr lang="sk-SK" sz="2400" dirty="0"/>
+          </a:p>
+          <a:p>
+            <a:pPr marL="342900" indent="-342900">
+              <a:buFont typeface="Arial" panose="020B0604020202020204" pitchFamily="34" charset="0"/>
+              <a:buChar char="•"/>
+            </a:pPr>
+            <a:r>
+              <a:rPr lang="sk-SK" sz="2400" dirty="0" smtClean="0"/>
+              <a:t>Preniesť žabku cez prekážky</a:t>
+            </a:r>
+          </a:p>
+          <a:p>
+            <a:pPr marL="342900" indent="-342900">
+              <a:buFont typeface="Arial" panose="020B0604020202020204" pitchFamily="34" charset="0"/>
+              <a:buChar char="•"/>
+            </a:pPr>
+            <a:endParaRPr lang="sk-SK" sz="2400" dirty="0"/>
+          </a:p>
+          <a:p>
+            <a:pPr marL="342900" indent="-342900">
+              <a:buFont typeface="Arial" panose="020B0604020202020204" pitchFamily="34" charset="0"/>
+              <a:buChar char="•"/>
+            </a:pPr>
+            <a:r>
+              <a:rPr lang="sk-SK" sz="2400" dirty="0" smtClean="0"/>
+              <a:t>Modifikovateľné v </a:t>
+            </a:r>
+            <a:r>
+              <a:rPr lang="sk-SK" sz="2400" dirty="0" err="1" smtClean="0"/>
+              <a:t>NetLogo</a:t>
+            </a:r>
+            <a:endParaRPr lang="sk-SK" sz="2400" dirty="0" smtClean="0"/>
+          </a:p>
+          <a:p>
+            <a:pPr marL="342900" indent="-342900">
+              <a:buFont typeface="Arial" panose="020B0604020202020204" pitchFamily="34" charset="0"/>
+              <a:buChar char="•"/>
+            </a:pPr>
+            <a:endParaRPr lang="sk-SK" sz="2400" dirty="0"/>
+          </a:p>
+          <a:p>
+            <a:pPr marL="342900" indent="-342900">
+              <a:buFont typeface="Arial" panose="020B0604020202020204" pitchFamily="34" charset="0"/>
+              <a:buChar char="•"/>
+            </a:pPr>
+            <a:r>
+              <a:rPr lang="sk-SK" sz="2400" dirty="0" smtClean="0"/>
+              <a:t>Levely hry, štyri smery pohybov, </a:t>
+            </a:r>
+          </a:p>
+          <a:p>
+            <a:pPr marL="342900" indent="-342900">
+              <a:buFont typeface="Arial" panose="020B0604020202020204" pitchFamily="34" charset="0"/>
+              <a:buChar char="•"/>
+            </a:pPr>
+            <a:endParaRPr lang="sk-SK" sz="2400" dirty="0"/>
+          </a:p>
+          <a:p>
+            <a:pPr marL="342900" indent="-342900">
+              <a:buFont typeface="Arial" panose="020B0604020202020204" pitchFamily="34" charset="0"/>
+              <a:buChar char="•"/>
+            </a:pPr>
+            <a:r>
+              <a:rPr lang="sk-SK" sz="2400" dirty="0" smtClean="0"/>
+              <a:t>Statické objekty – Nepredstavujú hrozbu ale nedá sa cez </a:t>
+            </a:r>
+            <a:r>
+              <a:rPr lang="sk-SK" sz="2400" dirty="0" err="1" smtClean="0"/>
+              <a:t>ne</a:t>
+            </a:r>
+            <a:r>
+              <a:rPr lang="sk-SK" sz="2400" dirty="0" smtClean="0"/>
+              <a:t> prejsť</a:t>
+            </a:r>
+            <a:endParaRPr lang="sk-SK" sz="2400" dirty="0"/>
           </a:p>
         </p:txBody>
       </p:sp>
     </p:spTree>
     <p:extLst>
       <p:ext uri="{BB962C8B-B14F-4D97-AF65-F5344CB8AC3E}">
-        <p14:creationId xmlns:p14="http://schemas.microsoft.com/office/powerpoint/2010/main" val="1220078396"/>
+        <p14:creationId xmlns:p14="http://schemas.microsoft.com/office/powerpoint/2010/main" val="4146880880"/>
       </p:ext>
     </p:extLst>
   </p:cSld>
@@ -6863,13 +7035,7 @@
       </p:grpSpPr>
       <p:sp>
         <p:nvSpPr>
-          <p:cNvPr id="2" name="Slide Number Placeholder 1">
-            <a:extLst>
-              <a:ext uri="{FF2B5EF4-FFF2-40B4-BE49-F238E27FC236}">
-                <a16:creationId xmlns:a16="http://schemas.microsoft.com/office/drawing/2014/main" id="{C76DB1EB-EA4D-40F9-5962-B91618C3C2F0}"/>
-              </a:ext>
-            </a:extLst>
-          </p:cNvPr>
+          <p:cNvPr id="2" name="Zástupný symbol čísla snímky 1"/>
           <p:cNvSpPr>
             <a:spLocks noGrp="1"/>
           </p:cNvSpPr>
@@ -6893,58 +7059,145 @@
       </p:sp>
       <p:sp>
         <p:nvSpPr>
-          <p:cNvPr id="3" name="Picture Placeholder 2">
+          <p:cNvPr id="8" name="TextBox 4">
             <a:extLst>
               <a:ext uri="{FF2B5EF4-FFF2-40B4-BE49-F238E27FC236}">
-                <a16:creationId xmlns:a16="http://schemas.microsoft.com/office/drawing/2014/main" id="{4B8A47E8-62C4-066A-BC1F-0A3DF428E879}"/>
+                <a16:creationId xmlns:a16="http://schemas.microsoft.com/office/drawing/2014/main" xmlns="" id="{01F492A4-FF4D-DF8E-ABBB-92929169DB1D}"/>
               </a:ext>
             </a:extLst>
           </p:cNvPr>
-          <p:cNvSpPr>
-            <a:spLocks noGrp="1"/>
-          </p:cNvSpPr>
-          <p:nvPr>
-            <p:ph type="pic" idx="1"/>
-          </p:nvPr>
+          <p:cNvSpPr txBox="1"/>
+          <p:nvPr/>
         </p:nvSpPr>
-        <p:spPr/>
+        <p:spPr>
+          <a:xfrm>
+            <a:off x="544236" y="634482"/>
+            <a:ext cx="11647764" cy="707886"/>
+          </a:xfrm>
+          <a:prstGeom prst="rect">
+            <a:avLst/>
+          </a:prstGeom>
+          <a:noFill/>
+        </p:spPr>
         <p:txBody>
-          <a:bodyPr/>
+          <a:bodyPr wrap="square" rtlCol="0">
+            <a:spAutoFit/>
+          </a:bodyPr>
           <a:lstStyle/>
           <a:p>
-            <a:endParaRPr lang="en-US"/>
+            <a:r>
+              <a:rPr lang="sk-SK" sz="4000" dirty="0" smtClean="0">
+                <a:latin typeface="Arial" panose="020B0604020202020204" pitchFamily="34" charset="0"/>
+                <a:cs typeface="Arial" panose="020B0604020202020204" pitchFamily="34" charset="0"/>
+              </a:rPr>
+              <a:t>Riešený projekt – </a:t>
+            </a:r>
+            <a:r>
+              <a:rPr lang="sk-SK" sz="4000" dirty="0" err="1" smtClean="0">
+                <a:latin typeface="Arial" panose="020B0604020202020204" pitchFamily="34" charset="0"/>
+                <a:cs typeface="Arial" panose="020B0604020202020204" pitchFamily="34" charset="0"/>
+              </a:rPr>
+              <a:t>F</a:t>
+            </a:r>
+            <a:r>
+              <a:rPr lang="sk-SK" sz="4000" dirty="0" err="1" smtClean="0">
+                <a:latin typeface="Arial" panose="020B0604020202020204" pitchFamily="34" charset="0"/>
+                <a:cs typeface="Arial" panose="020B0604020202020204" pitchFamily="34" charset="0"/>
+              </a:rPr>
+              <a:t>rogger</a:t>
+            </a:r>
+            <a:r>
+              <a:rPr lang="sk-SK" sz="4000" dirty="0" smtClean="0">
+                <a:latin typeface="Arial" panose="020B0604020202020204" pitchFamily="34" charset="0"/>
+                <a:cs typeface="Arial" panose="020B0604020202020204" pitchFamily="34" charset="0"/>
+              </a:rPr>
+              <a:t> – Vlastné modifikácie </a:t>
+            </a:r>
+            <a:endParaRPr lang="en-US" sz="4000" dirty="0">
+              <a:latin typeface="Arial" panose="020B0604020202020204" pitchFamily="34" charset="0"/>
+              <a:cs typeface="Arial" panose="020B0604020202020204" pitchFamily="34" charset="0"/>
+            </a:endParaRPr>
           </a:p>
         </p:txBody>
       </p:sp>
       <p:sp>
         <p:nvSpPr>
-          <p:cNvPr id="4" name="Title 3">
+          <p:cNvPr id="9" name="BlokTextu 3">
             <a:extLst>
               <a:ext uri="{FF2B5EF4-FFF2-40B4-BE49-F238E27FC236}">
-                <a16:creationId xmlns:a16="http://schemas.microsoft.com/office/drawing/2014/main" id="{64A35B77-8C54-D836-4578-136F075B084A}"/>
+                <a16:creationId xmlns:a16="http://schemas.microsoft.com/office/drawing/2014/main" xmlns="" id="{D4C40A90-040D-9EF0-8383-909BF294BB42}"/>
               </a:ext>
             </a:extLst>
           </p:cNvPr>
-          <p:cNvSpPr>
-            <a:spLocks noGrp="1"/>
-          </p:cNvSpPr>
-          <p:nvPr>
-            <p:ph type="title"/>
-          </p:nvPr>
+          <p:cNvSpPr txBox="1"/>
+          <p:nvPr/>
         </p:nvSpPr>
-        <p:spPr/>
+        <p:spPr>
+          <a:xfrm>
+            <a:off x="385616" y="1699397"/>
+            <a:ext cx="10922000" cy="1938992"/>
+          </a:xfrm>
+          <a:prstGeom prst="rect">
+            <a:avLst/>
+          </a:prstGeom>
+          <a:noFill/>
+        </p:spPr>
         <p:txBody>
-          <a:bodyPr/>
+          <a:bodyPr wrap="square" rtlCol="0">
+            <a:spAutoFit/>
+          </a:bodyPr>
           <a:lstStyle/>
           <a:p>
-            <a:endParaRPr lang="en-US"/>
+            <a:pPr marL="342900" indent="-342900">
+              <a:buFont typeface="Arial" panose="020B0604020202020204" pitchFamily="34" charset="0"/>
+              <a:buChar char="•"/>
+            </a:pPr>
+            <a:r>
+              <a:rPr lang="sk-SK" sz="2400" dirty="0" smtClean="0"/>
+              <a:t>Lepšia grafika a dizajn</a:t>
+            </a:r>
+          </a:p>
+          <a:p>
+            <a:pPr marL="342900" indent="-342900">
+              <a:buFont typeface="Arial" panose="020B0604020202020204" pitchFamily="34" charset="0"/>
+              <a:buChar char="•"/>
+            </a:pPr>
+            <a:endParaRPr lang="sk-SK" sz="2400" dirty="0"/>
+          </a:p>
+          <a:p>
+            <a:pPr marL="342900" indent="-342900">
+              <a:buFont typeface="Arial" panose="020B0604020202020204" pitchFamily="34" charset="0"/>
+              <a:buChar char="•"/>
+            </a:pPr>
+            <a:r>
+              <a:rPr lang="sk-SK" sz="2400" dirty="0" smtClean="0"/>
+              <a:t>Pridanie novej prekážky</a:t>
+            </a:r>
+          </a:p>
+          <a:p>
+            <a:pPr marL="342900" indent="-342900">
+              <a:buFont typeface="Arial" panose="020B0604020202020204" pitchFamily="34" charset="0"/>
+              <a:buChar char="•"/>
+            </a:pPr>
+            <a:endParaRPr lang="sk-SK" sz="2400" dirty="0"/>
+          </a:p>
+          <a:p>
+            <a:pPr marL="342900" indent="-342900">
+              <a:buFont typeface="Arial" panose="020B0604020202020204" pitchFamily="34" charset="0"/>
+              <a:buChar char="•"/>
+            </a:pPr>
+            <a:r>
+              <a:rPr lang="sk-SK" sz="2400" dirty="0" smtClean="0"/>
+              <a:t>Nie sú zakomponované tlačidlá ŠTART a NOVÁ HRA </a:t>
+            </a:r>
+            <a:endParaRPr lang="sk-SK" sz="2400" dirty="0"/>
           </a:p>
         </p:txBody>
       </p:sp>
     </p:spTree>
     <p:extLst>
       <p:ext uri="{BB962C8B-B14F-4D97-AF65-F5344CB8AC3E}">
-        <p14:creationId xmlns:p14="http://schemas.microsoft.com/office/powerpoint/2010/main" val="2837791078"/>
+        <p14:creationId xmlns:p14="http://schemas.microsoft.com/office/powerpoint/2010/main" val="703448685"/>
       </p:ext>
     </p:extLst>
   </p:cSld>
@@ -7000,7 +7253,7 @@
           <p:cNvPr id="5" name="TextBox 4">
             <a:extLst>
               <a:ext uri="{FF2B5EF4-FFF2-40B4-BE49-F238E27FC236}">
-                <a16:creationId xmlns:a16="http://schemas.microsoft.com/office/drawing/2014/main" id="{01F492A4-FF4D-DF8E-ABBB-92929169DB1D}"/>
+                <a16:creationId xmlns:a16="http://schemas.microsoft.com/office/drawing/2014/main" xmlns="" id="{01F492A4-FF4D-DF8E-ABBB-92929169DB1D}"/>
               </a:ext>
             </a:extLst>
           </p:cNvPr>
@@ -7042,7 +7295,7 @@
           <p:cNvPr id="7" name="BlokTextu 3">
             <a:extLst>
               <a:ext uri="{FF2B5EF4-FFF2-40B4-BE49-F238E27FC236}">
-                <a16:creationId xmlns:a16="http://schemas.microsoft.com/office/drawing/2014/main" id="{D4C40A90-040D-9EF0-8383-909BF294BB42}"/>
+                <a16:creationId xmlns:a16="http://schemas.microsoft.com/office/drawing/2014/main" xmlns="" id="{D4C40A90-040D-9EF0-8383-909BF294BB42}"/>
               </a:ext>
             </a:extLst>
           </p:cNvPr>
@@ -7250,7 +7503,7 @@
           <p:cNvPr id="3" name="Nadpis 3">
             <a:extLst>
               <a:ext uri="{FF2B5EF4-FFF2-40B4-BE49-F238E27FC236}">
-                <a16:creationId xmlns:a16="http://schemas.microsoft.com/office/drawing/2014/main" id="{2984E19B-AD44-4735-B4B2-2E5C74BEBCD1}"/>
+                <a16:creationId xmlns:a16="http://schemas.microsoft.com/office/drawing/2014/main" xmlns="" id="{2984E19B-AD44-4735-B4B2-2E5C74BEBCD1}"/>
               </a:ext>
             </a:extLst>
           </p:cNvPr>
@@ -7319,7 +7572,7 @@
           <p:cNvPr id="5" name="Picture 4">
             <a:extLst>
               <a:ext uri="{FF2B5EF4-FFF2-40B4-BE49-F238E27FC236}">
-                <a16:creationId xmlns:a16="http://schemas.microsoft.com/office/drawing/2014/main" id="{FEE7F0DD-0B4E-A14C-81B2-41B814CAD932}"/>
+                <a16:creationId xmlns:a16="http://schemas.microsoft.com/office/drawing/2014/main" xmlns="" id="{FEE7F0DD-0B4E-A14C-81B2-41B814CAD932}"/>
               </a:ext>
             </a:extLst>
           </p:cNvPr>
@@ -7379,7 +7632,7 @@
           <p:cNvPr id="2" name="Slide Number Placeholder 1">
             <a:extLst>
               <a:ext uri="{FF2B5EF4-FFF2-40B4-BE49-F238E27FC236}">
-                <a16:creationId xmlns:a16="http://schemas.microsoft.com/office/drawing/2014/main" id="{79304A00-AD48-ED9D-18E9-65075DAE65BA}"/>
+                <a16:creationId xmlns:a16="http://schemas.microsoft.com/office/drawing/2014/main" xmlns="" id="{79304A00-AD48-ED9D-18E9-65075DAE65BA}"/>
               </a:ext>
             </a:extLst>
           </p:cNvPr>
@@ -7409,7 +7662,7 @@
           <p:cNvPr id="3" name="Zástupný objekt pre číslo snímky 5">
             <a:extLst>
               <a:ext uri="{FF2B5EF4-FFF2-40B4-BE49-F238E27FC236}">
-                <a16:creationId xmlns:a16="http://schemas.microsoft.com/office/drawing/2014/main" id="{08A60631-E3F5-EAFC-6029-DA668E906CD3}"/>
+                <a16:creationId xmlns:a16="http://schemas.microsoft.com/office/drawing/2014/main" xmlns="" id="{08A60631-E3F5-EAFC-6029-DA668E906CD3}"/>
               </a:ext>
             </a:extLst>
           </p:cNvPr>
@@ -7539,7 +7792,7 @@
           <p:cNvPr id="4" name="TextBox 3">
             <a:extLst>
               <a:ext uri="{FF2B5EF4-FFF2-40B4-BE49-F238E27FC236}">
-                <a16:creationId xmlns:a16="http://schemas.microsoft.com/office/drawing/2014/main" id="{B4622178-8371-4387-F63B-32DA8A29D6E3}"/>
+                <a16:creationId xmlns:a16="http://schemas.microsoft.com/office/drawing/2014/main" xmlns="" id="{B4622178-8371-4387-F63B-32DA8A29D6E3}"/>
               </a:ext>
             </a:extLst>
           </p:cNvPr>
@@ -7581,7 +7834,7 @@
           <p:cNvPr id="5" name="BlokTextu 3">
             <a:extLst>
               <a:ext uri="{FF2B5EF4-FFF2-40B4-BE49-F238E27FC236}">
-                <a16:creationId xmlns:a16="http://schemas.microsoft.com/office/drawing/2014/main" id="{C58EF8FB-09B7-74C0-4212-57FA6CDD5A99}"/>
+                <a16:creationId xmlns:a16="http://schemas.microsoft.com/office/drawing/2014/main" xmlns="" id="{C58EF8FB-09B7-74C0-4212-57FA6CDD5A99}"/>
               </a:ext>
             </a:extLst>
           </p:cNvPr>
@@ -7718,7 +7971,7 @@
           <p:cNvPr id="2" name="Slide Number Placeholder 1">
             <a:extLst>
               <a:ext uri="{FF2B5EF4-FFF2-40B4-BE49-F238E27FC236}">
-                <a16:creationId xmlns:a16="http://schemas.microsoft.com/office/drawing/2014/main" id="{7A3B3B93-058F-929A-2D67-4E3606D82CA5}"/>
+                <a16:creationId xmlns:a16="http://schemas.microsoft.com/office/drawing/2014/main" xmlns="" id="{7A3B3B93-058F-929A-2D67-4E3606D82CA5}"/>
               </a:ext>
             </a:extLst>
           </p:cNvPr>
@@ -7748,7 +8001,7 @@
           <p:cNvPr id="3" name="Slide Number Placeholder 1">
             <a:extLst>
               <a:ext uri="{FF2B5EF4-FFF2-40B4-BE49-F238E27FC236}">
-                <a16:creationId xmlns:a16="http://schemas.microsoft.com/office/drawing/2014/main" id="{25E832D9-9E93-CF73-6406-3D2F0AFCFAD9}"/>
+                <a16:creationId xmlns:a16="http://schemas.microsoft.com/office/drawing/2014/main" xmlns="" id="{25E832D9-9E93-CF73-6406-3D2F0AFCFAD9}"/>
               </a:ext>
             </a:extLst>
           </p:cNvPr>
@@ -7878,7 +8131,7 @@
           <p:cNvPr id="4" name="Zástupný objekt pre číslo snímky 5">
             <a:extLst>
               <a:ext uri="{FF2B5EF4-FFF2-40B4-BE49-F238E27FC236}">
-                <a16:creationId xmlns:a16="http://schemas.microsoft.com/office/drawing/2014/main" id="{3E9E8FED-0D6A-AD36-5411-C5B86A8D1798}"/>
+                <a16:creationId xmlns:a16="http://schemas.microsoft.com/office/drawing/2014/main" xmlns="" id="{3E9E8FED-0D6A-AD36-5411-C5B86A8D1798}"/>
               </a:ext>
             </a:extLst>
           </p:cNvPr>
@@ -8008,7 +8261,7 @@
           <p:cNvPr id="5" name="TextBox 4">
             <a:extLst>
               <a:ext uri="{FF2B5EF4-FFF2-40B4-BE49-F238E27FC236}">
-                <a16:creationId xmlns:a16="http://schemas.microsoft.com/office/drawing/2014/main" id="{C6E944EC-92B2-0516-358D-9EAA7659FF3B}"/>
+                <a16:creationId xmlns:a16="http://schemas.microsoft.com/office/drawing/2014/main" xmlns="" id="{C6E944EC-92B2-0516-358D-9EAA7659FF3B}"/>
               </a:ext>
             </a:extLst>
           </p:cNvPr>
@@ -8050,7 +8303,7 @@
           <p:cNvPr id="6" name="BlokTextu 3">
             <a:extLst>
               <a:ext uri="{FF2B5EF4-FFF2-40B4-BE49-F238E27FC236}">
-                <a16:creationId xmlns:a16="http://schemas.microsoft.com/office/drawing/2014/main" id="{68674BC3-EE1C-9DD4-07DA-E2DEDAA2A8B4}"/>
+                <a16:creationId xmlns:a16="http://schemas.microsoft.com/office/drawing/2014/main" xmlns="" id="{68674BC3-EE1C-9DD4-07DA-E2DEDAA2A8B4}"/>
               </a:ext>
             </a:extLst>
           </p:cNvPr>
@@ -8119,13 +8372,7 @@
       </p:sp>
       <p:pic>
         <p:nvPicPr>
-          <p:cNvPr id="8" name="Picture 7">
-            <a:extLst>
-              <a:ext uri="{FF2B5EF4-FFF2-40B4-BE49-F238E27FC236}">
-                <a16:creationId xmlns:a16="http://schemas.microsoft.com/office/drawing/2014/main" id="{3A433A6C-4691-A3C0-F827-B430D07A0F4A}"/>
-              </a:ext>
-            </a:extLst>
-          </p:cNvPr>
+          <p:cNvPr id="7" name="Obrázok 6"/>
           <p:cNvPicPr>
             <a:picLocks noChangeAspect="1"/>
           </p:cNvPicPr>
@@ -8139,8 +8386,8 @@
         </p:blipFill>
         <p:spPr>
           <a:xfrm>
-            <a:off x="4615626" y="2891225"/>
-            <a:ext cx="6882223" cy="3262863"/>
+            <a:off x="5346441" y="3025754"/>
+            <a:ext cx="6845754" cy="3208241"/>
           </a:xfrm>
           <a:prstGeom prst="rect">
             <a:avLst/>
@@ -8182,7 +8429,7 @@
           <p:cNvPr id="2" name="Slide Number Placeholder 1">
             <a:extLst>
               <a:ext uri="{FF2B5EF4-FFF2-40B4-BE49-F238E27FC236}">
-                <a16:creationId xmlns:a16="http://schemas.microsoft.com/office/drawing/2014/main" id="{6AA2E6A4-8DA1-F0C4-56AA-9FB4D94734BA}"/>
+                <a16:creationId xmlns:a16="http://schemas.microsoft.com/office/drawing/2014/main" xmlns="" id="{6AA2E6A4-8DA1-F0C4-56AA-9FB4D94734BA}"/>
               </a:ext>
             </a:extLst>
           </p:cNvPr>
@@ -8212,7 +8459,7 @@
           <p:cNvPr id="3" name="Slide Number Placeholder 1">
             <a:extLst>
               <a:ext uri="{FF2B5EF4-FFF2-40B4-BE49-F238E27FC236}">
-                <a16:creationId xmlns:a16="http://schemas.microsoft.com/office/drawing/2014/main" id="{46D3100F-9AE9-768F-68BF-F5CB166C9B3F}"/>
+                <a16:creationId xmlns:a16="http://schemas.microsoft.com/office/drawing/2014/main" xmlns="" id="{46D3100F-9AE9-768F-68BF-F5CB166C9B3F}"/>
               </a:ext>
             </a:extLst>
           </p:cNvPr>
@@ -8342,7 +8589,7 @@
           <p:cNvPr id="4" name="Zástupný objekt pre číslo snímky 5">
             <a:extLst>
               <a:ext uri="{FF2B5EF4-FFF2-40B4-BE49-F238E27FC236}">
-                <a16:creationId xmlns:a16="http://schemas.microsoft.com/office/drawing/2014/main" id="{55152845-0CEB-10D3-F733-3EBBABB18C53}"/>
+                <a16:creationId xmlns:a16="http://schemas.microsoft.com/office/drawing/2014/main" xmlns="" id="{55152845-0CEB-10D3-F733-3EBBABB18C53}"/>
               </a:ext>
             </a:extLst>
           </p:cNvPr>
@@ -8472,7 +8719,7 @@
           <p:cNvPr id="5" name="TextBox 4">
             <a:extLst>
               <a:ext uri="{FF2B5EF4-FFF2-40B4-BE49-F238E27FC236}">
-                <a16:creationId xmlns:a16="http://schemas.microsoft.com/office/drawing/2014/main" id="{C51ADDD3-F0D2-7429-437E-9C5D66A3E037}"/>
+                <a16:creationId xmlns:a16="http://schemas.microsoft.com/office/drawing/2014/main" xmlns="" id="{C51ADDD3-F0D2-7429-437E-9C5D66A3E037}"/>
               </a:ext>
             </a:extLst>
           </p:cNvPr>
@@ -8514,7 +8761,7 @@
           <p:cNvPr id="6" name="BlokTextu 3">
             <a:extLst>
               <a:ext uri="{FF2B5EF4-FFF2-40B4-BE49-F238E27FC236}">
-                <a16:creationId xmlns:a16="http://schemas.microsoft.com/office/drawing/2014/main" id="{B7B17F23-9332-629B-6C32-C0B18F351875}"/>
+                <a16:creationId xmlns:a16="http://schemas.microsoft.com/office/drawing/2014/main" xmlns="" id="{B7B17F23-9332-629B-6C32-C0B18F351875}"/>
               </a:ext>
             </a:extLst>
           </p:cNvPr>
@@ -8524,7 +8771,7 @@
         <p:spPr>
           <a:xfrm>
             <a:off x="385616" y="1699397"/>
-            <a:ext cx="10922000" cy="1938992"/>
+            <a:ext cx="10922000" cy="830997"/>
           </a:xfrm>
           <a:prstGeom prst="rect">
             <a:avLst/>
@@ -8542,50 +8789,7 @@
               <a:buChar char="•"/>
             </a:pPr>
             <a:r>
-              <a:rPr lang="sk-SK" sz="2400" dirty="0" err="1"/>
-              <a:t>Zmenit</a:t>
-            </a:r>
-            <a:r>
-              <a:rPr lang="sk-SK" sz="2400" dirty="0"/>
-              <a:t> </a:t>
-            </a:r>
-            <a:r>
-              <a:rPr lang="sk-SK" sz="2400" dirty="0" err="1"/>
-              <a:t>repozitar</a:t>
-            </a:r>
-            <a:r>
-              <a:rPr lang="sk-SK" sz="2400" dirty="0"/>
-              <a:t> fotku</a:t>
-            </a:r>
-          </a:p>
-          <a:p>
-            <a:pPr marL="342900" indent="-342900">
-              <a:buFont typeface="Arial" panose="020B0604020202020204" pitchFamily="34" charset="0"/>
-              <a:buChar char="•"/>
-            </a:pPr>
-            <a:r>
-              <a:rPr lang="sk-SK" sz="2400" dirty="0"/>
-              <a:t>Zdroje</a:t>
-            </a:r>
-          </a:p>
-          <a:p>
-            <a:pPr marL="342900" indent="-342900">
-              <a:buFont typeface="Arial" panose="020B0604020202020204" pitchFamily="34" charset="0"/>
-              <a:buChar char="•"/>
-            </a:pPr>
-            <a:r>
-              <a:rPr lang="sk-SK" sz="2400" dirty="0" err="1"/>
-              <a:t>Specifikacia</a:t>
-            </a:r>
-            <a:endParaRPr lang="sk-SK" sz="2400" dirty="0"/>
-          </a:p>
-          <a:p>
-            <a:pPr marL="342900" indent="-342900">
-              <a:buFont typeface="Arial" panose="020B0604020202020204" pitchFamily="34" charset="0"/>
-              <a:buChar char="•"/>
-            </a:pPr>
-            <a:r>
-              <a:rPr lang="sk-SK" sz="2400"/>
+              <a:rPr lang="sk-SK" sz="2400" dirty="0" smtClean="0"/>
               <a:t>UML</a:t>
             </a:r>
             <a:endParaRPr lang="sk-SK" sz="2400" dirty="0"/>

</xml_diff>